<commit_message>
modification et conclusion de gd docs
</commit_message>
<xml_diff>
--- a/Docs/game flow et regles a suivre.pptx
+++ b/Docs/game flow et regles a suivre.pptx
@@ -4,10 +4,14 @@
   <p:sldMasterIdLst>
     <p:sldMasterId id="2147483648" r:id="rId1"/>
   </p:sldMasterIdLst>
+  <p:notesMasterIdLst>
+    <p:notesMasterId r:id="rId6"/>
+  </p:notesMasterIdLst>
   <p:sldIdLst>
     <p:sldId id="256" r:id="rId2"/>
     <p:sldId id="257" r:id="rId3"/>
     <p:sldId id="258" r:id="rId4"/>
+    <p:sldId id="259" r:id="rId5"/>
   </p:sldIdLst>
   <p:sldSz cx="9144000" cy="6858000" type="screen4x3"/>
   <p:notesSz cx="6858000" cy="9144000"/>
@@ -107,6 +111,440 @@
     </a:lvl9pPr>
   </p:defaultTextStyle>
 </p:presentation>
+</file>
+
+<file path=ppt/notesMasters/notesMaster1.xml><?xml version="1.0" encoding="utf-8"?>
+<p:notesMaster xmlns:a="http://schemas.openxmlformats.org/drawingml/2006/main" xmlns:r="http://schemas.openxmlformats.org/officeDocument/2006/relationships" xmlns:p="http://schemas.openxmlformats.org/presentationml/2006/main">
+  <p:cSld>
+    <p:bg>
+      <p:bgRef idx="1001">
+        <a:schemeClr val="bg1"/>
+      </p:bgRef>
+    </p:bg>
+    <p:spTree>
+      <p:nvGrpSpPr>
+        <p:cNvPr id="1" name=""/>
+        <p:cNvGrpSpPr/>
+        <p:nvPr/>
+      </p:nvGrpSpPr>
+      <p:grpSpPr>
+        <a:xfrm>
+          <a:off x="0" y="0"/>
+          <a:ext cx="0" cy="0"/>
+          <a:chOff x="0" y="0"/>
+          <a:chExt cx="0" cy="0"/>
+        </a:xfrm>
+      </p:grpSpPr>
+      <p:sp>
+        <p:nvSpPr>
+          <p:cNvPr id="2" name="Espace réservé de l'en-tête 1"/>
+          <p:cNvSpPr>
+            <a:spLocks noGrp="1"/>
+          </p:cNvSpPr>
+          <p:nvPr>
+            <p:ph type="hdr" sz="quarter"/>
+          </p:nvPr>
+        </p:nvSpPr>
+        <p:spPr>
+          <a:xfrm>
+            <a:off x="0" y="0"/>
+            <a:ext cx="2971800" cy="457200"/>
+          </a:xfrm>
+          <a:prstGeom prst="rect">
+            <a:avLst/>
+          </a:prstGeom>
+        </p:spPr>
+        <p:txBody>
+          <a:bodyPr vert="horz" lIns="91440" tIns="45720" rIns="91440" bIns="45720" rtlCol="0"/>
+          <a:lstStyle>
+            <a:lvl1pPr algn="l">
+              <a:defRPr sz="1200"/>
+            </a:lvl1pPr>
+          </a:lstStyle>
+          <a:p>
+            <a:endParaRPr lang="fr-FR"/>
+          </a:p>
+        </p:txBody>
+      </p:sp>
+      <p:sp>
+        <p:nvSpPr>
+          <p:cNvPr id="3" name="Espace réservé de la date 2"/>
+          <p:cNvSpPr>
+            <a:spLocks noGrp="1"/>
+          </p:cNvSpPr>
+          <p:nvPr>
+            <p:ph type="dt" idx="1"/>
+          </p:nvPr>
+        </p:nvSpPr>
+        <p:spPr>
+          <a:xfrm>
+            <a:off x="3884613" y="0"/>
+            <a:ext cx="2971800" cy="457200"/>
+          </a:xfrm>
+          <a:prstGeom prst="rect">
+            <a:avLst/>
+          </a:prstGeom>
+        </p:spPr>
+        <p:txBody>
+          <a:bodyPr vert="horz" lIns="91440" tIns="45720" rIns="91440" bIns="45720" rtlCol="0"/>
+          <a:lstStyle>
+            <a:lvl1pPr algn="r">
+              <a:defRPr sz="1200"/>
+            </a:lvl1pPr>
+          </a:lstStyle>
+          <a:p>
+            <a:fld id="{0270DB2C-BD92-47CA-913B-62B46E8D37DA}" type="datetimeFigureOut">
+              <a:rPr lang="fr-FR" smtClean="0"/>
+              <a:t>30/08/2014</a:t>
+            </a:fld>
+            <a:endParaRPr lang="fr-FR"/>
+          </a:p>
+        </p:txBody>
+      </p:sp>
+      <p:sp>
+        <p:nvSpPr>
+          <p:cNvPr id="4" name="Espace réservé de l'image des diapositives 3"/>
+          <p:cNvSpPr>
+            <a:spLocks noGrp="1" noRot="1" noChangeAspect="1"/>
+          </p:cNvSpPr>
+          <p:nvPr>
+            <p:ph type="sldImg" idx="2"/>
+          </p:nvPr>
+        </p:nvSpPr>
+        <p:spPr>
+          <a:xfrm>
+            <a:off x="1143000" y="685800"/>
+            <a:ext cx="4572000" cy="3429000"/>
+          </a:xfrm>
+          <a:prstGeom prst="rect">
+            <a:avLst/>
+          </a:prstGeom>
+          <a:noFill/>
+          <a:ln w="12700">
+            <a:solidFill>
+              <a:prstClr val="black"/>
+            </a:solidFill>
+          </a:ln>
+        </p:spPr>
+        <p:txBody>
+          <a:bodyPr vert="horz" lIns="91440" tIns="45720" rIns="91440" bIns="45720" rtlCol="0" anchor="ctr"/>
+          <a:lstStyle/>
+          <a:p>
+            <a:endParaRPr lang="fr-FR"/>
+          </a:p>
+        </p:txBody>
+      </p:sp>
+      <p:sp>
+        <p:nvSpPr>
+          <p:cNvPr id="5" name="Espace réservé des commentaires 4"/>
+          <p:cNvSpPr>
+            <a:spLocks noGrp="1"/>
+          </p:cNvSpPr>
+          <p:nvPr>
+            <p:ph type="body" sz="quarter" idx="3"/>
+          </p:nvPr>
+        </p:nvSpPr>
+        <p:spPr>
+          <a:xfrm>
+            <a:off x="685800" y="4343400"/>
+            <a:ext cx="5486400" cy="4114800"/>
+          </a:xfrm>
+          <a:prstGeom prst="rect">
+            <a:avLst/>
+          </a:prstGeom>
+        </p:spPr>
+        <p:txBody>
+          <a:bodyPr vert="horz" lIns="91440" tIns="45720" rIns="91440" bIns="45720" rtlCol="0"/>
+          <a:lstStyle/>
+          <a:p>
+            <a:pPr lvl="0"/>
+            <a:r>
+              <a:rPr lang="fr-FR" smtClean="0"/>
+              <a:t>Modifiez les styles du texte du masque</a:t>
+            </a:r>
+          </a:p>
+          <a:p>
+            <a:pPr lvl="1"/>
+            <a:r>
+              <a:rPr lang="fr-FR" smtClean="0"/>
+              <a:t>Deuxième niveau</a:t>
+            </a:r>
+          </a:p>
+          <a:p>
+            <a:pPr lvl="2"/>
+            <a:r>
+              <a:rPr lang="fr-FR" smtClean="0"/>
+              <a:t>Troisième niveau</a:t>
+            </a:r>
+          </a:p>
+          <a:p>
+            <a:pPr lvl="3"/>
+            <a:r>
+              <a:rPr lang="fr-FR" smtClean="0"/>
+              <a:t>Quatrième niveau</a:t>
+            </a:r>
+          </a:p>
+          <a:p>
+            <a:pPr lvl="4"/>
+            <a:r>
+              <a:rPr lang="fr-FR" smtClean="0"/>
+              <a:t>Cinquième niveau</a:t>
+            </a:r>
+            <a:endParaRPr lang="fr-FR"/>
+          </a:p>
+        </p:txBody>
+      </p:sp>
+      <p:sp>
+        <p:nvSpPr>
+          <p:cNvPr id="6" name="Espace réservé du pied de page 5"/>
+          <p:cNvSpPr>
+            <a:spLocks noGrp="1"/>
+          </p:cNvSpPr>
+          <p:nvPr>
+            <p:ph type="ftr" sz="quarter" idx="4"/>
+          </p:nvPr>
+        </p:nvSpPr>
+        <p:spPr>
+          <a:xfrm>
+            <a:off x="0" y="8685213"/>
+            <a:ext cx="2971800" cy="457200"/>
+          </a:xfrm>
+          <a:prstGeom prst="rect">
+            <a:avLst/>
+          </a:prstGeom>
+        </p:spPr>
+        <p:txBody>
+          <a:bodyPr vert="horz" lIns="91440" tIns="45720" rIns="91440" bIns="45720" rtlCol="0" anchor="b"/>
+          <a:lstStyle>
+            <a:lvl1pPr algn="l">
+              <a:defRPr sz="1200"/>
+            </a:lvl1pPr>
+          </a:lstStyle>
+          <a:p>
+            <a:endParaRPr lang="fr-FR"/>
+          </a:p>
+        </p:txBody>
+      </p:sp>
+      <p:sp>
+        <p:nvSpPr>
+          <p:cNvPr id="7" name="Espace réservé du numéro de diapositive 6"/>
+          <p:cNvSpPr>
+            <a:spLocks noGrp="1"/>
+          </p:cNvSpPr>
+          <p:nvPr>
+            <p:ph type="sldNum" sz="quarter" idx="5"/>
+          </p:nvPr>
+        </p:nvSpPr>
+        <p:spPr>
+          <a:xfrm>
+            <a:off x="3884613" y="8685213"/>
+            <a:ext cx="2971800" cy="457200"/>
+          </a:xfrm>
+          <a:prstGeom prst="rect">
+            <a:avLst/>
+          </a:prstGeom>
+        </p:spPr>
+        <p:txBody>
+          <a:bodyPr vert="horz" lIns="91440" tIns="45720" rIns="91440" bIns="45720" rtlCol="0" anchor="b"/>
+          <a:lstStyle>
+            <a:lvl1pPr algn="r">
+              <a:defRPr sz="1200"/>
+            </a:lvl1pPr>
+          </a:lstStyle>
+          <a:p>
+            <a:fld id="{E0F4B6BA-B8CE-46E3-BE0D-EDE5B32510CB}" type="slidenum">
+              <a:rPr lang="fr-FR" smtClean="0"/>
+              <a:t>‹N°›</a:t>
+            </a:fld>
+            <a:endParaRPr lang="fr-FR"/>
+          </a:p>
+        </p:txBody>
+      </p:sp>
+    </p:spTree>
+    <p:extLst>
+      <p:ext uri="{BB962C8B-B14F-4D97-AF65-F5344CB8AC3E}">
+        <p14:creationId xmlns:p14="http://schemas.microsoft.com/office/powerpoint/2010/main" val="2198321178"/>
+      </p:ext>
+    </p:extLst>
+  </p:cSld>
+  <p:clrMap bg1="lt1" tx1="dk1" bg2="lt2" tx2="dk2" accent1="accent1" accent2="accent2" accent3="accent3" accent4="accent4" accent5="accent5" accent6="accent6" hlink="hlink" folHlink="folHlink"/>
+  <p:notesStyle>
+    <a:lvl1pPr marL="0" algn="l" defTabSz="914400" rtl="0" eaLnBrk="1" latinLnBrk="0" hangingPunct="1">
+      <a:defRPr sz="1200" kern="1200">
+        <a:solidFill>
+          <a:schemeClr val="tx1"/>
+        </a:solidFill>
+        <a:latin typeface="+mn-lt"/>
+        <a:ea typeface="+mn-ea"/>
+        <a:cs typeface="+mn-cs"/>
+      </a:defRPr>
+    </a:lvl1pPr>
+    <a:lvl2pPr marL="457200" algn="l" defTabSz="914400" rtl="0" eaLnBrk="1" latinLnBrk="0" hangingPunct="1">
+      <a:defRPr sz="1200" kern="1200">
+        <a:solidFill>
+          <a:schemeClr val="tx1"/>
+        </a:solidFill>
+        <a:latin typeface="+mn-lt"/>
+        <a:ea typeface="+mn-ea"/>
+        <a:cs typeface="+mn-cs"/>
+      </a:defRPr>
+    </a:lvl2pPr>
+    <a:lvl3pPr marL="914400" algn="l" defTabSz="914400" rtl="0" eaLnBrk="1" latinLnBrk="0" hangingPunct="1">
+      <a:defRPr sz="1200" kern="1200">
+        <a:solidFill>
+          <a:schemeClr val="tx1"/>
+        </a:solidFill>
+        <a:latin typeface="+mn-lt"/>
+        <a:ea typeface="+mn-ea"/>
+        <a:cs typeface="+mn-cs"/>
+      </a:defRPr>
+    </a:lvl3pPr>
+    <a:lvl4pPr marL="1371600" algn="l" defTabSz="914400" rtl="0" eaLnBrk="1" latinLnBrk="0" hangingPunct="1">
+      <a:defRPr sz="1200" kern="1200">
+        <a:solidFill>
+          <a:schemeClr val="tx1"/>
+        </a:solidFill>
+        <a:latin typeface="+mn-lt"/>
+        <a:ea typeface="+mn-ea"/>
+        <a:cs typeface="+mn-cs"/>
+      </a:defRPr>
+    </a:lvl4pPr>
+    <a:lvl5pPr marL="1828800" algn="l" defTabSz="914400" rtl="0" eaLnBrk="1" latinLnBrk="0" hangingPunct="1">
+      <a:defRPr sz="1200" kern="1200">
+        <a:solidFill>
+          <a:schemeClr val="tx1"/>
+        </a:solidFill>
+        <a:latin typeface="+mn-lt"/>
+        <a:ea typeface="+mn-ea"/>
+        <a:cs typeface="+mn-cs"/>
+      </a:defRPr>
+    </a:lvl5pPr>
+    <a:lvl6pPr marL="2286000" algn="l" defTabSz="914400" rtl="0" eaLnBrk="1" latinLnBrk="0" hangingPunct="1">
+      <a:defRPr sz="1200" kern="1200">
+        <a:solidFill>
+          <a:schemeClr val="tx1"/>
+        </a:solidFill>
+        <a:latin typeface="+mn-lt"/>
+        <a:ea typeface="+mn-ea"/>
+        <a:cs typeface="+mn-cs"/>
+      </a:defRPr>
+    </a:lvl6pPr>
+    <a:lvl7pPr marL="2743200" algn="l" defTabSz="914400" rtl="0" eaLnBrk="1" latinLnBrk="0" hangingPunct="1">
+      <a:defRPr sz="1200" kern="1200">
+        <a:solidFill>
+          <a:schemeClr val="tx1"/>
+        </a:solidFill>
+        <a:latin typeface="+mn-lt"/>
+        <a:ea typeface="+mn-ea"/>
+        <a:cs typeface="+mn-cs"/>
+      </a:defRPr>
+    </a:lvl7pPr>
+    <a:lvl8pPr marL="3200400" algn="l" defTabSz="914400" rtl="0" eaLnBrk="1" latinLnBrk="0" hangingPunct="1">
+      <a:defRPr sz="1200" kern="1200">
+        <a:solidFill>
+          <a:schemeClr val="tx1"/>
+        </a:solidFill>
+        <a:latin typeface="+mn-lt"/>
+        <a:ea typeface="+mn-ea"/>
+        <a:cs typeface="+mn-cs"/>
+      </a:defRPr>
+    </a:lvl8pPr>
+    <a:lvl9pPr marL="3657600" algn="l" defTabSz="914400" rtl="0" eaLnBrk="1" latinLnBrk="0" hangingPunct="1">
+      <a:defRPr sz="1200" kern="1200">
+        <a:solidFill>
+          <a:schemeClr val="tx1"/>
+        </a:solidFill>
+        <a:latin typeface="+mn-lt"/>
+        <a:ea typeface="+mn-ea"/>
+        <a:cs typeface="+mn-cs"/>
+      </a:defRPr>
+    </a:lvl9pPr>
+  </p:notesStyle>
+</p:notesMaster>
+</file>
+
+<file path=ppt/notesSlides/notesSlide1.xml><?xml version="1.0" encoding="utf-8"?>
+<p:notes xmlns:a="http://schemas.openxmlformats.org/drawingml/2006/main" xmlns:r="http://schemas.openxmlformats.org/officeDocument/2006/relationships" xmlns:p="http://schemas.openxmlformats.org/presentationml/2006/main">
+  <p:cSld>
+    <p:spTree>
+      <p:nvGrpSpPr>
+        <p:cNvPr id="1" name=""/>
+        <p:cNvGrpSpPr/>
+        <p:nvPr/>
+      </p:nvGrpSpPr>
+      <p:grpSpPr>
+        <a:xfrm>
+          <a:off x="0" y="0"/>
+          <a:ext cx="0" cy="0"/>
+          <a:chOff x="0" y="0"/>
+          <a:chExt cx="0" cy="0"/>
+        </a:xfrm>
+      </p:grpSpPr>
+      <p:sp>
+        <p:nvSpPr>
+          <p:cNvPr id="2" name="Espace réservé de l'image des diapositives 1"/>
+          <p:cNvSpPr>
+            <a:spLocks noGrp="1" noRot="1" noChangeAspect="1"/>
+          </p:cNvSpPr>
+          <p:nvPr>
+            <p:ph type="sldImg"/>
+          </p:nvPr>
+        </p:nvSpPr>
+        <p:spPr/>
+      </p:sp>
+      <p:sp>
+        <p:nvSpPr>
+          <p:cNvPr id="3" name="Espace réservé des commentaires 2"/>
+          <p:cNvSpPr>
+            <a:spLocks noGrp="1"/>
+          </p:cNvSpPr>
+          <p:nvPr>
+            <p:ph type="body" idx="1"/>
+          </p:nvPr>
+        </p:nvSpPr>
+        <p:spPr/>
+        <p:txBody>
+          <a:bodyPr/>
+          <a:lstStyle/>
+          <a:p>
+            <a:endParaRPr lang="fr-FR" dirty="0"/>
+          </a:p>
+        </p:txBody>
+      </p:sp>
+      <p:sp>
+        <p:nvSpPr>
+          <p:cNvPr id="4" name="Espace réservé du numéro de diapositive 3"/>
+          <p:cNvSpPr>
+            <a:spLocks noGrp="1"/>
+          </p:cNvSpPr>
+          <p:nvPr>
+            <p:ph type="sldNum" sz="quarter" idx="10"/>
+          </p:nvPr>
+        </p:nvSpPr>
+        <p:spPr/>
+        <p:txBody>
+          <a:bodyPr/>
+          <a:lstStyle/>
+          <a:p>
+            <a:fld id="{E0F4B6BA-B8CE-46E3-BE0D-EDE5B32510CB}" type="slidenum">
+              <a:rPr lang="fr-FR" smtClean="0"/>
+              <a:t>3</a:t>
+            </a:fld>
+            <a:endParaRPr lang="fr-FR"/>
+          </a:p>
+        </p:txBody>
+      </p:sp>
+    </p:spTree>
+    <p:extLst>
+      <p:ext uri="{BB962C8B-B14F-4D97-AF65-F5344CB8AC3E}">
+        <p14:creationId xmlns:p14="http://schemas.microsoft.com/office/powerpoint/2010/main" val="4261975465"/>
+      </p:ext>
+    </p:extLst>
+  </p:cSld>
+  <p:clrMapOvr>
+    <a:masterClrMapping/>
+  </p:clrMapOvr>
+</p:notes>
 </file>
 
 <file path=ppt/slideLayouts/slideLayout1.xml><?xml version="1.0" encoding="utf-8"?>
@@ -3604,6 +4042,76 @@
           </a:p>
         </p:txBody>
       </p:sp>
+      <p:sp>
+        <p:nvSpPr>
+          <p:cNvPr id="3" name="ZoneTexte 2"/>
+          <p:cNvSpPr txBox="1"/>
+          <p:nvPr/>
+        </p:nvSpPr>
+        <p:spPr>
+          <a:xfrm>
+            <a:off x="9056" y="460678"/>
+            <a:ext cx="2850204" cy="461665"/>
+          </a:xfrm>
+          <a:prstGeom prst="rect">
+            <a:avLst/>
+          </a:prstGeom>
+          <a:noFill/>
+        </p:spPr>
+        <p:txBody>
+          <a:bodyPr wrap="none" rtlCol="0">
+            <a:spAutoFit/>
+          </a:bodyPr>
+          <a:lstStyle/>
+          <a:p>
+            <a:r>
+              <a:rPr lang="fr-FR" sz="2400" u="sng" dirty="0" smtClean="0">
+                <a:effectLst>
+                  <a:outerShdw blurRad="38100" dist="38100" dir="2700000" algn="tl">
+                    <a:srgbClr val="000000">
+                      <a:alpha val="43137"/>
+                    </a:srgbClr>
+                  </a:outerShdw>
+                </a:effectLst>
+              </a:rPr>
+              <a:t>Flow de la state </a:t>
+            </a:r>
+            <a:r>
+              <a:rPr lang="fr-FR" sz="2400" u="sng" dirty="0" err="1" smtClean="0">
+                <a:effectLst>
+                  <a:outerShdw blurRad="38100" dist="38100" dir="2700000" algn="tl">
+                    <a:srgbClr val="000000">
+                      <a:alpha val="43137"/>
+                    </a:srgbClr>
+                  </a:outerShdw>
+                </a:effectLst>
+              </a:rPr>
+              <a:t>run</a:t>
+            </a:r>
+            <a:r>
+              <a:rPr lang="fr-FR" sz="2400" u="sng" dirty="0" smtClean="0">
+                <a:effectLst>
+                  <a:outerShdw blurRad="38100" dist="38100" dir="2700000" algn="tl">
+                    <a:srgbClr val="000000">
+                      <a:alpha val="43137"/>
+                    </a:srgbClr>
+                  </a:outerShdw>
+                </a:effectLst>
+              </a:rPr>
+              <a:t> : </a:t>
+            </a:r>
+            <a:endParaRPr lang="fr-FR" sz="2400" u="sng" dirty="0">
+              <a:effectLst>
+                <a:outerShdw blurRad="38100" dist="38100" dir="2700000" algn="tl">
+                  <a:srgbClr val="000000">
+                    <a:alpha val="43137"/>
+                  </a:srgbClr>
+                </a:outerShdw>
+              </a:effectLst>
+            </a:endParaRPr>
+          </a:p>
+        </p:txBody>
+      </p:sp>
     </p:spTree>
     <p:extLst>
       <p:ext uri="{BB962C8B-B14F-4D97-AF65-F5344CB8AC3E}">
@@ -3664,10 +4172,26 @@
           <a:lstStyle/>
           <a:p>
             <a:r>
-              <a:rPr lang="fr-FR" sz="3200" u="sng" dirty="0" smtClean="0"/>
+              <a:rPr lang="fr-FR" sz="3200" u="sng" dirty="0" smtClean="0">
+                <a:effectLst>
+                  <a:outerShdw blurRad="38100" dist="38100" dir="2700000" algn="tl">
+                    <a:srgbClr val="000000">
+                      <a:alpha val="43137"/>
+                    </a:srgbClr>
+                  </a:outerShdw>
+                </a:effectLst>
+              </a:rPr>
               <a:t>DEGATS SUR LES ENNEMIS</a:t>
             </a:r>
-            <a:endParaRPr lang="fr-FR" sz="3200" u="sng" dirty="0"/>
+            <a:endParaRPr lang="fr-FR" sz="3200" u="sng" dirty="0">
+              <a:effectLst>
+                <a:outerShdw blurRad="38100" dist="38100" dir="2700000" algn="tl">
+                  <a:srgbClr val="000000">
+                    <a:alpha val="43137"/>
+                  </a:srgbClr>
+                </a:outerShdw>
+              </a:effectLst>
+            </a:endParaRPr>
           </a:p>
         </p:txBody>
       </p:sp>
@@ -4150,6 +4674,44 @@
             <a:r>
               <a:rPr lang="fr-FR" dirty="0" smtClean="0"/>
               <a:t> de l’ennemi dans le tableau ennemis</a:t>
+            </a:r>
+            <a:endParaRPr lang="fr-FR" dirty="0"/>
+          </a:p>
+        </p:txBody>
+      </p:sp>
+      <p:sp>
+        <p:nvSpPr>
+          <p:cNvPr id="3" name="ZoneTexte 2"/>
+          <p:cNvSpPr txBox="1"/>
+          <p:nvPr/>
+        </p:nvSpPr>
+        <p:spPr>
+          <a:xfrm>
+            <a:off x="4040746" y="786151"/>
+            <a:ext cx="3787960" cy="369332"/>
+          </a:xfrm>
+          <a:prstGeom prst="rect">
+            <a:avLst/>
+          </a:prstGeom>
+          <a:noFill/>
+        </p:spPr>
+        <p:txBody>
+          <a:bodyPr wrap="none" rtlCol="0">
+            <a:spAutoFit/>
+          </a:bodyPr>
+          <a:lstStyle/>
+          <a:p>
+            <a:r>
+              <a:rPr lang="fr-FR" dirty="0" smtClean="0"/>
+              <a:t>( </a:t>
+            </a:r>
+            <a:r>
+              <a:rPr lang="fr-FR" dirty="0" err="1" smtClean="0"/>
+              <a:t>colisions</a:t>
+            </a:r>
+            <a:r>
+              <a:rPr lang="fr-FR" dirty="0" smtClean="0"/>
+              <a:t> entre lapin[i] et ennemis[i] )</a:t>
             </a:r>
             <a:endParaRPr lang="fr-FR" dirty="0"/>
           </a:p>
@@ -4192,10 +4754,820 @@
           <a:chExt cx="0" cy="0"/>
         </a:xfrm>
       </p:grpSpPr>
+      <p:sp>
+        <p:nvSpPr>
+          <p:cNvPr id="4" name="ZoneTexte 3"/>
+          <p:cNvSpPr txBox="1"/>
+          <p:nvPr/>
+        </p:nvSpPr>
+        <p:spPr>
+          <a:xfrm>
+            <a:off x="323528" y="260648"/>
+            <a:ext cx="8524449" cy="1077218"/>
+          </a:xfrm>
+          <a:prstGeom prst="rect">
+            <a:avLst/>
+          </a:prstGeom>
+          <a:noFill/>
+        </p:spPr>
+        <p:txBody>
+          <a:bodyPr wrap="none" rtlCol="0">
+            <a:spAutoFit/>
+          </a:bodyPr>
+          <a:lstStyle/>
+          <a:p>
+            <a:r>
+              <a:rPr lang="fr-FR" sz="3200" u="sng" dirty="0" smtClean="0">
+                <a:effectLst>
+                  <a:outerShdw blurRad="38100" dist="38100" dir="2700000" algn="tl">
+                    <a:srgbClr val="000000">
+                      <a:alpha val="43137"/>
+                    </a:srgbClr>
+                  </a:outerShdw>
+                </a:effectLst>
+              </a:rPr>
+              <a:t>DEGATS DES ENNEMIS SUR LE POINT A PROTOGER</a:t>
+            </a:r>
+          </a:p>
+          <a:p>
+            <a:r>
+              <a:rPr lang="fr-FR" sz="3200" dirty="0" smtClean="0"/>
+              <a:t>(collisions entre ennemi[i] et friteuse)</a:t>
+            </a:r>
+            <a:endParaRPr lang="fr-FR" sz="3200" dirty="0"/>
+          </a:p>
+        </p:txBody>
+      </p:sp>
+      <p:sp>
+        <p:nvSpPr>
+          <p:cNvPr id="5" name="Hexagone 4"/>
+          <p:cNvSpPr/>
+          <p:nvPr/>
+        </p:nvSpPr>
+        <p:spPr>
+          <a:xfrm>
+            <a:off x="467544" y="1361693"/>
+            <a:ext cx="2088232" cy="1728192"/>
+          </a:xfrm>
+          <a:prstGeom prst="hexagon">
+            <a:avLst/>
+          </a:prstGeom>
+          <a:solidFill>
+            <a:schemeClr val="tx1"/>
+          </a:solidFill>
+        </p:spPr>
+        <p:style>
+          <a:lnRef idx="2">
+            <a:schemeClr val="accent1">
+              <a:shade val="50000"/>
+            </a:schemeClr>
+          </a:lnRef>
+          <a:fillRef idx="1">
+            <a:schemeClr val="accent1"/>
+          </a:fillRef>
+          <a:effectRef idx="0">
+            <a:schemeClr val="accent1"/>
+          </a:effectRef>
+          <a:fontRef idx="minor">
+            <a:schemeClr val="lt1"/>
+          </a:fontRef>
+        </p:style>
+        <p:txBody>
+          <a:bodyPr rtlCol="0" anchor="ctr"/>
+          <a:lstStyle/>
+          <a:p>
+            <a:pPr algn="ctr"/>
+            <a:r>
+              <a:rPr lang="fr-FR" dirty="0" smtClean="0"/>
+              <a:t>Si l’ennemi entre en collision avec la friteuse</a:t>
+            </a:r>
+          </a:p>
+          <a:p>
+            <a:pPr algn="ctr"/>
+            <a:r>
+              <a:rPr lang="fr-FR" dirty="0" smtClean="0"/>
+              <a:t>(collision == </a:t>
+            </a:r>
+            <a:r>
+              <a:rPr lang="fr-FR" dirty="0" err="1" smtClean="0"/>
+              <a:t>true</a:t>
+            </a:r>
+            <a:r>
+              <a:rPr lang="fr-FR" dirty="0" smtClean="0"/>
+              <a:t>)</a:t>
+            </a:r>
+            <a:endParaRPr lang="fr-FR" dirty="0"/>
+          </a:p>
+        </p:txBody>
+      </p:sp>
+      <p:cxnSp>
+        <p:nvCxnSpPr>
+          <p:cNvPr id="7" name="Connecteur droit avec flèche 6"/>
+          <p:cNvCxnSpPr/>
+          <p:nvPr/>
+        </p:nvCxnSpPr>
+        <p:spPr>
+          <a:xfrm>
+            <a:off x="1511660" y="3089885"/>
+            <a:ext cx="0" cy="915179"/>
+          </a:xfrm>
+          <a:prstGeom prst="straightConnector1">
+            <a:avLst/>
+          </a:prstGeom>
+          <a:ln>
+            <a:tailEnd type="arrow"/>
+          </a:ln>
+        </p:spPr>
+        <p:style>
+          <a:lnRef idx="1">
+            <a:schemeClr val="accent1"/>
+          </a:lnRef>
+          <a:fillRef idx="0">
+            <a:schemeClr val="accent1"/>
+          </a:fillRef>
+          <a:effectRef idx="0">
+            <a:schemeClr val="accent1"/>
+          </a:effectRef>
+          <a:fontRef idx="minor">
+            <a:schemeClr val="tx1"/>
+          </a:fontRef>
+        </p:style>
+      </p:cxnSp>
+      <p:sp>
+        <p:nvSpPr>
+          <p:cNvPr id="8" name="Rectangle 7"/>
+          <p:cNvSpPr/>
+          <p:nvPr/>
+        </p:nvSpPr>
+        <p:spPr>
+          <a:xfrm>
+            <a:off x="323528" y="4005064"/>
+            <a:ext cx="2869468" cy="1152128"/>
+          </a:xfrm>
+          <a:prstGeom prst="rect">
+            <a:avLst/>
+          </a:prstGeom>
+        </p:spPr>
+        <p:style>
+          <a:lnRef idx="2">
+            <a:schemeClr val="accent1">
+              <a:shade val="50000"/>
+            </a:schemeClr>
+          </a:lnRef>
+          <a:fillRef idx="1">
+            <a:schemeClr val="accent1"/>
+          </a:fillRef>
+          <a:effectRef idx="0">
+            <a:schemeClr val="accent1"/>
+          </a:effectRef>
+          <a:fontRef idx="minor">
+            <a:schemeClr val="lt1"/>
+          </a:fontRef>
+        </p:style>
+        <p:txBody>
+          <a:bodyPr rtlCol="0" anchor="ctr"/>
+          <a:lstStyle/>
+          <a:p>
+            <a:pPr algn="ctr"/>
+            <a:r>
+              <a:rPr lang="fr-FR" dirty="0" err="1" smtClean="0"/>
+              <a:t>vieDeLaFriteurse</a:t>
+            </a:r>
+            <a:r>
+              <a:rPr lang="fr-FR" dirty="0" smtClean="0"/>
+              <a:t> -- </a:t>
+            </a:r>
+            <a:endParaRPr lang="fr-FR" dirty="0"/>
+          </a:p>
+        </p:txBody>
+      </p:sp>
+      <p:cxnSp>
+        <p:nvCxnSpPr>
+          <p:cNvPr id="11" name="Connecteur droit avec flèche 10"/>
+          <p:cNvCxnSpPr>
+            <a:stCxn id="8" idx="3"/>
+            <a:endCxn id="15" idx="3"/>
+          </p:cNvCxnSpPr>
+          <p:nvPr/>
+        </p:nvCxnSpPr>
+        <p:spPr>
+          <a:xfrm>
+            <a:off x="3192996" y="4581128"/>
+            <a:ext cx="1090972" cy="0"/>
+          </a:xfrm>
+          <a:prstGeom prst="straightConnector1">
+            <a:avLst/>
+          </a:prstGeom>
+          <a:ln>
+            <a:tailEnd type="arrow"/>
+          </a:ln>
+        </p:spPr>
+        <p:style>
+          <a:lnRef idx="1">
+            <a:schemeClr val="accent1"/>
+          </a:lnRef>
+          <a:fillRef idx="0">
+            <a:schemeClr val="accent1"/>
+          </a:fillRef>
+          <a:effectRef idx="0">
+            <a:schemeClr val="accent1"/>
+          </a:effectRef>
+          <a:fontRef idx="minor">
+            <a:schemeClr val="tx1"/>
+          </a:fontRef>
+        </p:style>
+      </p:cxnSp>
+      <p:sp>
+        <p:nvSpPr>
+          <p:cNvPr id="15" name="Hexagone 14"/>
+          <p:cNvSpPr/>
+          <p:nvPr/>
+        </p:nvSpPr>
+        <p:spPr>
+          <a:xfrm>
+            <a:off x="4283968" y="3717032"/>
+            <a:ext cx="2520280" cy="1728192"/>
+          </a:xfrm>
+          <a:prstGeom prst="hexagon">
+            <a:avLst/>
+          </a:prstGeom>
+        </p:spPr>
+        <p:style>
+          <a:lnRef idx="2">
+            <a:schemeClr val="accent1">
+              <a:shade val="50000"/>
+            </a:schemeClr>
+          </a:lnRef>
+          <a:fillRef idx="1">
+            <a:schemeClr val="accent1"/>
+          </a:fillRef>
+          <a:effectRef idx="0">
+            <a:schemeClr val="accent1"/>
+          </a:effectRef>
+          <a:fontRef idx="minor">
+            <a:schemeClr val="lt1"/>
+          </a:fontRef>
+        </p:style>
+        <p:txBody>
+          <a:bodyPr rtlCol="0" anchor="ctr"/>
+          <a:lstStyle/>
+          <a:p>
+            <a:pPr algn="ctr"/>
+            <a:r>
+              <a:rPr lang="fr-FR" dirty="0" smtClean="0"/>
+              <a:t>Si </a:t>
+            </a:r>
+            <a:r>
+              <a:rPr lang="fr-FR" dirty="0" err="1" smtClean="0"/>
+              <a:t>vieDeLafriteuse</a:t>
+            </a:r>
+            <a:r>
+              <a:rPr lang="fr-FR" dirty="0" smtClean="0"/>
+              <a:t> </a:t>
+            </a:r>
+            <a:r>
+              <a:rPr lang="fr-FR" dirty="0" smtClean="0"/>
+              <a:t>est égal </a:t>
+            </a:r>
+            <a:r>
+              <a:rPr lang="fr-FR" dirty="0" smtClean="0"/>
+              <a:t>a 0 </a:t>
+            </a:r>
+            <a:endParaRPr lang="fr-FR" dirty="0"/>
+          </a:p>
+        </p:txBody>
+      </p:sp>
+      <p:cxnSp>
+        <p:nvCxnSpPr>
+          <p:cNvPr id="22" name="Connecteur droit avec flèche 21"/>
+          <p:cNvCxnSpPr>
+            <a:stCxn id="15" idx="0"/>
+            <a:endCxn id="23" idx="1"/>
+          </p:cNvCxnSpPr>
+          <p:nvPr/>
+        </p:nvCxnSpPr>
+        <p:spPr>
+          <a:xfrm flipV="1">
+            <a:off x="6804248" y="4545124"/>
+            <a:ext cx="792088" cy="36004"/>
+          </a:xfrm>
+          <a:prstGeom prst="straightConnector1">
+            <a:avLst/>
+          </a:prstGeom>
+          <a:ln>
+            <a:tailEnd type="arrow"/>
+          </a:ln>
+        </p:spPr>
+        <p:style>
+          <a:lnRef idx="1">
+            <a:schemeClr val="accent1"/>
+          </a:lnRef>
+          <a:fillRef idx="0">
+            <a:schemeClr val="accent1"/>
+          </a:fillRef>
+          <a:effectRef idx="0">
+            <a:schemeClr val="accent1"/>
+          </a:effectRef>
+          <a:fontRef idx="minor">
+            <a:schemeClr val="tx1"/>
+          </a:fontRef>
+        </p:style>
+      </p:cxnSp>
+      <p:sp>
+        <p:nvSpPr>
+          <p:cNvPr id="23" name="Rectangle 22"/>
+          <p:cNvSpPr/>
+          <p:nvPr/>
+        </p:nvSpPr>
+        <p:spPr>
+          <a:xfrm>
+            <a:off x="7596336" y="3933056"/>
+            <a:ext cx="1547664" cy="1224136"/>
+          </a:xfrm>
+          <a:prstGeom prst="rect">
+            <a:avLst/>
+          </a:prstGeom>
+        </p:spPr>
+        <p:style>
+          <a:lnRef idx="2">
+            <a:schemeClr val="accent1">
+              <a:shade val="50000"/>
+            </a:schemeClr>
+          </a:lnRef>
+          <a:fillRef idx="1">
+            <a:schemeClr val="accent1"/>
+          </a:fillRef>
+          <a:effectRef idx="0">
+            <a:schemeClr val="accent1"/>
+          </a:effectRef>
+          <a:fontRef idx="minor">
+            <a:schemeClr val="lt1"/>
+          </a:fontRef>
+        </p:style>
+        <p:txBody>
+          <a:bodyPr rtlCol="0" anchor="ctr"/>
+          <a:lstStyle/>
+          <a:p>
+            <a:pPr algn="ctr"/>
+            <a:r>
+              <a:rPr lang="fr-FR" dirty="0" smtClean="0"/>
+              <a:t>Game OVER !!!</a:t>
+            </a:r>
+            <a:endParaRPr lang="fr-FR" dirty="0"/>
+          </a:p>
+        </p:txBody>
+      </p:sp>
+      <p:sp>
+        <p:nvSpPr>
+          <p:cNvPr id="25" name="ZoneTexte 24"/>
+          <p:cNvSpPr txBox="1"/>
+          <p:nvPr/>
+        </p:nvSpPr>
+        <p:spPr>
+          <a:xfrm>
+            <a:off x="401144" y="5445224"/>
+            <a:ext cx="2725452" cy="923330"/>
+          </a:xfrm>
+          <a:prstGeom prst="rect">
+            <a:avLst/>
+          </a:prstGeom>
+          <a:noFill/>
+        </p:spPr>
+        <p:txBody>
+          <a:bodyPr wrap="square" rtlCol="0">
+            <a:spAutoFit/>
+          </a:bodyPr>
+          <a:lstStyle/>
+          <a:p>
+            <a:r>
+              <a:rPr lang="fr-FR" dirty="0" smtClean="0"/>
+              <a:t>(chaque ennemis infligera 1 </a:t>
+            </a:r>
+            <a:r>
+              <a:rPr lang="fr-FR" dirty="0" err="1" smtClean="0"/>
+              <a:t>pv</a:t>
+            </a:r>
+            <a:r>
+              <a:rPr lang="fr-FR" dirty="0" smtClean="0"/>
+              <a:t> a la vie de la friteuse, peut importe le type)</a:t>
+            </a:r>
+            <a:endParaRPr lang="fr-FR" dirty="0"/>
+          </a:p>
+        </p:txBody>
+      </p:sp>
     </p:spTree>
     <p:extLst>
       <p:ext uri="{BB962C8B-B14F-4D97-AF65-F5344CB8AC3E}">
         <p14:creationId xmlns:p14="http://schemas.microsoft.com/office/powerpoint/2010/main" val="847530813"/>
+      </p:ext>
+    </p:extLst>
+  </p:cSld>
+  <p:clrMapOvr>
+    <a:masterClrMapping/>
+  </p:clrMapOvr>
+</p:sld>
+</file>
+
+<file path=ppt/slides/slide4.xml><?xml version="1.0" encoding="utf-8"?>
+<p:sld xmlns:a="http://schemas.openxmlformats.org/drawingml/2006/main" xmlns:r="http://schemas.openxmlformats.org/officeDocument/2006/relationships" xmlns:p="http://schemas.openxmlformats.org/presentationml/2006/main">
+  <p:cSld>
+    <p:spTree>
+      <p:nvGrpSpPr>
+        <p:cNvPr id="1" name=""/>
+        <p:cNvGrpSpPr/>
+        <p:nvPr/>
+      </p:nvGrpSpPr>
+      <p:grpSpPr>
+        <a:xfrm>
+          <a:off x="0" y="0"/>
+          <a:ext cx="0" cy="0"/>
+          <a:chOff x="0" y="0"/>
+          <a:chExt cx="0" cy="0"/>
+        </a:xfrm>
+      </p:grpSpPr>
+      <p:sp>
+        <p:nvSpPr>
+          <p:cNvPr id="2" name="Titre 1"/>
+          <p:cNvSpPr>
+            <a:spLocks noGrp="1"/>
+          </p:cNvSpPr>
+          <p:nvPr>
+            <p:ph type="title"/>
+          </p:nvPr>
+        </p:nvSpPr>
+        <p:spPr/>
+        <p:txBody>
+          <a:bodyPr/>
+          <a:lstStyle/>
+          <a:p>
+            <a:r>
+              <a:rPr lang="fr-FR" dirty="0" smtClean="0"/>
+              <a:t>BOUCLE DE GAME PLAY :</a:t>
+            </a:r>
+            <a:endParaRPr lang="fr-FR" dirty="0"/>
+          </a:p>
+        </p:txBody>
+      </p:sp>
+      <p:sp>
+        <p:nvSpPr>
+          <p:cNvPr id="4" name="Ellipse 3"/>
+          <p:cNvSpPr/>
+          <p:nvPr/>
+        </p:nvSpPr>
+        <p:spPr>
+          <a:xfrm>
+            <a:off x="3124490" y="1052736"/>
+            <a:ext cx="2808312" cy="2520280"/>
+          </a:xfrm>
+          <a:prstGeom prst="ellipse">
+            <a:avLst/>
+          </a:prstGeom>
+        </p:spPr>
+        <p:style>
+          <a:lnRef idx="2">
+            <a:schemeClr val="accent1">
+              <a:shade val="50000"/>
+            </a:schemeClr>
+          </a:lnRef>
+          <a:fillRef idx="1">
+            <a:schemeClr val="accent1"/>
+          </a:fillRef>
+          <a:effectRef idx="0">
+            <a:schemeClr val="accent1"/>
+          </a:effectRef>
+          <a:fontRef idx="minor">
+            <a:schemeClr val="lt1"/>
+          </a:fontRef>
+        </p:style>
+        <p:txBody>
+          <a:bodyPr rtlCol="0" anchor="ctr"/>
+          <a:lstStyle/>
+          <a:p>
+            <a:pPr algn="ctr"/>
+            <a:r>
+              <a:rPr lang="fr-FR" u="sng" dirty="0" smtClean="0">
+                <a:effectLst>
+                  <a:outerShdw blurRad="38100" dist="38100" dir="2700000" algn="tl">
+                    <a:srgbClr val="000000">
+                      <a:alpha val="43137"/>
+                    </a:srgbClr>
+                  </a:outerShdw>
+                </a:effectLst>
+              </a:rPr>
+              <a:t>Objectifs:</a:t>
+            </a:r>
+          </a:p>
+          <a:p>
+            <a:pPr algn="ctr"/>
+            <a:r>
+              <a:rPr lang="fr-FR" dirty="0" smtClean="0"/>
+              <a:t> défendre la friteuse pour ne pas que la tribu des poisson pannés ne meurt de froid.</a:t>
+            </a:r>
+            <a:endParaRPr lang="fr-FR" dirty="0"/>
+          </a:p>
+        </p:txBody>
+      </p:sp>
+      <p:sp>
+        <p:nvSpPr>
+          <p:cNvPr id="6" name="Ellipse 5"/>
+          <p:cNvSpPr/>
+          <p:nvPr/>
+        </p:nvSpPr>
+        <p:spPr>
+          <a:xfrm>
+            <a:off x="737320" y="3573016"/>
+            <a:ext cx="2808312" cy="2520280"/>
+          </a:xfrm>
+          <a:prstGeom prst="ellipse">
+            <a:avLst/>
+          </a:prstGeom>
+        </p:spPr>
+        <p:style>
+          <a:lnRef idx="2">
+            <a:schemeClr val="accent1">
+              <a:shade val="50000"/>
+            </a:schemeClr>
+          </a:lnRef>
+          <a:fillRef idx="1">
+            <a:schemeClr val="accent1"/>
+          </a:fillRef>
+          <a:effectRef idx="0">
+            <a:schemeClr val="accent1"/>
+          </a:effectRef>
+          <a:fontRef idx="minor">
+            <a:schemeClr val="lt1"/>
+          </a:fontRef>
+        </p:style>
+        <p:txBody>
+          <a:bodyPr rtlCol="0" anchor="ctr"/>
+          <a:lstStyle/>
+          <a:p>
+            <a:pPr algn="ctr"/>
+            <a:r>
+              <a:rPr lang="fr-FR" u="sng" dirty="0" smtClean="0">
+                <a:effectLst>
+                  <a:outerShdw blurRad="38100" dist="38100" dir="2700000" algn="tl">
+                    <a:srgbClr val="000000">
+                      <a:alpha val="43137"/>
+                    </a:srgbClr>
+                  </a:outerShdw>
+                </a:effectLst>
+              </a:rPr>
+              <a:t>Challenges :</a:t>
+            </a:r>
+          </a:p>
+          <a:p>
+            <a:pPr algn="ctr"/>
+            <a:r>
+              <a:rPr lang="fr-FR" dirty="0" smtClean="0"/>
+              <a:t>Réussir a viser les ennemis qui défilent assez rapidement avant qu’ils ne touchent la friteuse (</a:t>
+            </a:r>
+            <a:r>
+              <a:rPr lang="fr-FR" dirty="0" err="1" smtClean="0"/>
+              <a:t>lol</a:t>
+            </a:r>
+            <a:r>
+              <a:rPr lang="fr-FR" dirty="0" smtClean="0"/>
+              <a:t>)</a:t>
+            </a:r>
+          </a:p>
+          <a:p>
+            <a:pPr algn="ctr"/>
+            <a:r>
+              <a:rPr lang="fr-FR" dirty="0" smtClean="0"/>
+              <a:t>Et </a:t>
+            </a:r>
+            <a:r>
+              <a:rPr lang="fr-FR" dirty="0" err="1" smtClean="0"/>
+              <a:t>detruisent</a:t>
+            </a:r>
+            <a:r>
+              <a:rPr lang="fr-FR" dirty="0" smtClean="0"/>
+              <a:t> la friteuse</a:t>
+            </a:r>
+            <a:endParaRPr lang="fr-FR" dirty="0"/>
+          </a:p>
+        </p:txBody>
+      </p:sp>
+      <p:sp>
+        <p:nvSpPr>
+          <p:cNvPr id="7" name="Ellipse 6"/>
+          <p:cNvSpPr/>
+          <p:nvPr/>
+        </p:nvSpPr>
+        <p:spPr>
+          <a:xfrm>
+            <a:off x="5940152" y="3573016"/>
+            <a:ext cx="2808312" cy="2520280"/>
+          </a:xfrm>
+          <a:prstGeom prst="ellipse">
+            <a:avLst/>
+          </a:prstGeom>
+        </p:spPr>
+        <p:style>
+          <a:lnRef idx="2">
+            <a:schemeClr val="accent1">
+              <a:shade val="50000"/>
+            </a:schemeClr>
+          </a:lnRef>
+          <a:fillRef idx="1">
+            <a:schemeClr val="accent1"/>
+          </a:fillRef>
+          <a:effectRef idx="0">
+            <a:schemeClr val="accent1"/>
+          </a:effectRef>
+          <a:fontRef idx="minor">
+            <a:schemeClr val="lt1"/>
+          </a:fontRef>
+        </p:style>
+        <p:txBody>
+          <a:bodyPr rtlCol="0" anchor="ctr"/>
+          <a:lstStyle/>
+          <a:p>
+            <a:pPr algn="ctr"/>
+            <a:r>
+              <a:rPr lang="fr-FR" u="sng" dirty="0" smtClean="0">
+                <a:effectLst>
+                  <a:outerShdw blurRad="38100" dist="38100" dir="2700000" algn="tl">
+                    <a:srgbClr val="000000">
+                      <a:alpha val="43137"/>
+                    </a:srgbClr>
+                  </a:outerShdw>
+                </a:effectLst>
+              </a:rPr>
+              <a:t>Récompenses </a:t>
+            </a:r>
+            <a:r>
+              <a:rPr lang="fr-FR" u="sng" dirty="0">
+                <a:effectLst>
+                  <a:outerShdw blurRad="38100" dist="38100" dir="2700000" algn="tl">
+                    <a:srgbClr val="000000">
+                      <a:alpha val="43137"/>
+                    </a:srgbClr>
+                  </a:outerShdw>
+                </a:effectLst>
+              </a:rPr>
+              <a:t>:</a:t>
+            </a:r>
+          </a:p>
+          <a:p>
+            <a:pPr algn="ctr"/>
+            <a:r>
+              <a:rPr lang="fr-FR" dirty="0" err="1" smtClean="0"/>
+              <a:t>Fiérté</a:t>
+            </a:r>
+            <a:r>
+              <a:rPr lang="fr-FR" dirty="0" smtClean="0"/>
+              <a:t> d’avoir un bon score. GG </a:t>
+            </a:r>
+            <a:r>
+              <a:rPr lang="fr-FR" dirty="0" err="1" smtClean="0"/>
+              <a:t>dude</a:t>
+            </a:r>
+            <a:r>
+              <a:rPr lang="fr-FR" dirty="0" smtClean="0"/>
+              <a:t> !!</a:t>
+            </a:r>
+            <a:endParaRPr lang="fr-FR" dirty="0"/>
+          </a:p>
+        </p:txBody>
+      </p:sp>
+      <p:sp>
+        <p:nvSpPr>
+          <p:cNvPr id="8" name="Flèche courbée vers la droite 7"/>
+          <p:cNvSpPr/>
+          <p:nvPr/>
+        </p:nvSpPr>
+        <p:spPr>
+          <a:xfrm rot="2524969">
+            <a:off x="1698371" y="2212143"/>
+            <a:ext cx="886209" cy="1216152"/>
+          </a:xfrm>
+          <a:prstGeom prst="curvedRightArrow">
+            <a:avLst/>
+          </a:prstGeom>
+        </p:spPr>
+        <p:style>
+          <a:lnRef idx="2">
+            <a:schemeClr val="accent1">
+              <a:shade val="50000"/>
+            </a:schemeClr>
+          </a:lnRef>
+          <a:fillRef idx="1">
+            <a:schemeClr val="accent1"/>
+          </a:fillRef>
+          <a:effectRef idx="0">
+            <a:schemeClr val="accent1"/>
+          </a:effectRef>
+          <a:fontRef idx="minor">
+            <a:schemeClr val="lt1"/>
+          </a:fontRef>
+        </p:style>
+        <p:txBody>
+          <a:bodyPr rtlCol="0" anchor="ctr"/>
+          <a:lstStyle/>
+          <a:p>
+            <a:pPr algn="ctr"/>
+            <a:endParaRPr lang="fr-FR">
+              <a:solidFill>
+                <a:schemeClr val="tx1"/>
+              </a:solidFill>
+            </a:endParaRPr>
+          </a:p>
+        </p:txBody>
+      </p:sp>
+      <p:sp>
+        <p:nvSpPr>
+          <p:cNvPr id="9" name="Flèche courbée vers la droite 8"/>
+          <p:cNvSpPr/>
+          <p:nvPr/>
+        </p:nvSpPr>
+        <p:spPr>
+          <a:xfrm rot="16200000">
+            <a:off x="4452934" y="4700195"/>
+            <a:ext cx="886209" cy="3096346"/>
+          </a:xfrm>
+          <a:prstGeom prst="curvedRightArrow">
+            <a:avLst/>
+          </a:prstGeom>
+        </p:spPr>
+        <p:style>
+          <a:lnRef idx="2">
+            <a:schemeClr val="accent1">
+              <a:shade val="50000"/>
+            </a:schemeClr>
+          </a:lnRef>
+          <a:fillRef idx="1">
+            <a:schemeClr val="accent1"/>
+          </a:fillRef>
+          <a:effectRef idx="0">
+            <a:schemeClr val="accent1"/>
+          </a:effectRef>
+          <a:fontRef idx="minor">
+            <a:schemeClr val="lt1"/>
+          </a:fontRef>
+        </p:style>
+        <p:txBody>
+          <a:bodyPr rtlCol="0" anchor="ctr"/>
+          <a:lstStyle/>
+          <a:p>
+            <a:pPr algn="ctr"/>
+            <a:endParaRPr lang="fr-FR">
+              <a:solidFill>
+                <a:schemeClr val="tx1"/>
+              </a:solidFill>
+            </a:endParaRPr>
+          </a:p>
+        </p:txBody>
+      </p:sp>
+      <p:sp>
+        <p:nvSpPr>
+          <p:cNvPr id="11" name="Flèche courbée vers la droite 10"/>
+          <p:cNvSpPr/>
+          <p:nvPr/>
+        </p:nvSpPr>
+        <p:spPr>
+          <a:xfrm rot="8670486">
+            <a:off x="6377907" y="2189839"/>
+            <a:ext cx="886209" cy="1216152"/>
+          </a:xfrm>
+          <a:prstGeom prst="curvedRightArrow">
+            <a:avLst/>
+          </a:prstGeom>
+        </p:spPr>
+        <p:style>
+          <a:lnRef idx="2">
+            <a:schemeClr val="accent1">
+              <a:shade val="50000"/>
+            </a:schemeClr>
+          </a:lnRef>
+          <a:fillRef idx="1">
+            <a:schemeClr val="accent1"/>
+          </a:fillRef>
+          <a:effectRef idx="0">
+            <a:schemeClr val="accent1"/>
+          </a:effectRef>
+          <a:fontRef idx="minor">
+            <a:schemeClr val="lt1"/>
+          </a:fontRef>
+        </p:style>
+        <p:txBody>
+          <a:bodyPr rtlCol="0" anchor="ctr"/>
+          <a:lstStyle/>
+          <a:p>
+            <a:pPr algn="ctr"/>
+            <a:endParaRPr lang="fr-FR">
+              <a:solidFill>
+                <a:schemeClr val="tx1"/>
+              </a:solidFill>
+            </a:endParaRPr>
+          </a:p>
+        </p:txBody>
+      </p:sp>
+    </p:spTree>
+    <p:extLst>
+      <p:ext uri="{BB962C8B-B14F-4D97-AF65-F5344CB8AC3E}">
+        <p14:creationId xmlns:p14="http://schemas.microsoft.com/office/powerpoint/2010/main" val="3104055741"/>
       </p:ext>
     </p:extLst>
   </p:cSld>
@@ -4486,4 +5858,289 @@
   <a:objectDefaults/>
   <a:extraClrSchemeLst/>
 </a:theme>
+</file>
+
+<file path=ppt/theme/theme2.xml><?xml version="1.0" encoding="utf-8"?>
+<a:theme xmlns:a="http://schemas.openxmlformats.org/drawingml/2006/main" name="Thème Office">
+  <a:themeElements>
+    <a:clrScheme name="Office">
+      <a:dk1>
+        <a:sysClr val="windowText" lastClr="000000"/>
+      </a:dk1>
+      <a:lt1>
+        <a:sysClr val="window" lastClr="FFFFFF"/>
+      </a:lt1>
+      <a:dk2>
+        <a:srgbClr val="1F497D"/>
+      </a:dk2>
+      <a:lt2>
+        <a:srgbClr val="EEECE1"/>
+      </a:lt2>
+      <a:accent1>
+        <a:srgbClr val="4F81BD"/>
+      </a:accent1>
+      <a:accent2>
+        <a:srgbClr val="C0504D"/>
+      </a:accent2>
+      <a:accent3>
+        <a:srgbClr val="9BBB59"/>
+      </a:accent3>
+      <a:accent4>
+        <a:srgbClr val="8064A2"/>
+      </a:accent4>
+      <a:accent5>
+        <a:srgbClr val="4BACC6"/>
+      </a:accent5>
+      <a:accent6>
+        <a:srgbClr val="F79646"/>
+      </a:accent6>
+      <a:hlink>
+        <a:srgbClr val="0000FF"/>
+      </a:hlink>
+      <a:folHlink>
+        <a:srgbClr val="800080"/>
+      </a:folHlink>
+    </a:clrScheme>
+    <a:fontScheme name="Office">
+      <a:majorFont>
+        <a:latin typeface="Calibri"/>
+        <a:ea typeface=""/>
+        <a:cs typeface=""/>
+        <a:font script="Jpan" typeface="ＭＳ Ｐゴシック"/>
+        <a:font script="Hang" typeface="맑은 고딕"/>
+        <a:font script="Hans" typeface="宋体"/>
+        <a:font script="Hant" typeface="新細明體"/>
+        <a:font script="Arab" typeface="Times New Roman"/>
+        <a:font script="Hebr" typeface="Times New Roman"/>
+        <a:font script="Thai" typeface="Angsana New"/>
+        <a:font script="Ethi" typeface="Nyala"/>
+        <a:font script="Beng" typeface="Vrinda"/>
+        <a:font script="Gujr" typeface="Shruti"/>
+        <a:font script="Khmr" typeface="MoolBoran"/>
+        <a:font script="Knda" typeface="Tunga"/>
+        <a:font script="Guru" typeface="Raavi"/>
+        <a:font script="Cans" typeface="Euphemia"/>
+        <a:font script="Cher" typeface="Plantagenet Cherokee"/>
+        <a:font script="Yiii" typeface="Microsoft Yi Baiti"/>
+        <a:font script="Tibt" typeface="Microsoft Himalaya"/>
+        <a:font script="Thaa" typeface="MV Boli"/>
+        <a:font script="Deva" typeface="Mangal"/>
+        <a:font script="Telu" typeface="Gautami"/>
+        <a:font script="Taml" typeface="Latha"/>
+        <a:font script="Syrc" typeface="Estrangelo Edessa"/>
+        <a:font script="Orya" typeface="Kalinga"/>
+        <a:font script="Mlym" typeface="Kartika"/>
+        <a:font script="Laoo" typeface="DokChampa"/>
+        <a:font script="Sinh" typeface="Iskoola Pota"/>
+        <a:font script="Mong" typeface="Mongolian Baiti"/>
+        <a:font script="Viet" typeface="Times New Roman"/>
+        <a:font script="Uigh" typeface="Microsoft Uighur"/>
+        <a:font script="Geor" typeface="Sylfaen"/>
+      </a:majorFont>
+      <a:minorFont>
+        <a:latin typeface="Calibri"/>
+        <a:ea typeface=""/>
+        <a:cs typeface=""/>
+        <a:font script="Jpan" typeface="ＭＳ Ｐゴシック"/>
+        <a:font script="Hang" typeface="맑은 고딕"/>
+        <a:font script="Hans" typeface="宋体"/>
+        <a:font script="Hant" typeface="新細明體"/>
+        <a:font script="Arab" typeface="Arial"/>
+        <a:font script="Hebr" typeface="Arial"/>
+        <a:font script="Thai" typeface="Cordia New"/>
+        <a:font script="Ethi" typeface="Nyala"/>
+        <a:font script="Beng" typeface="Vrinda"/>
+        <a:font script="Gujr" typeface="Shruti"/>
+        <a:font script="Khmr" typeface="DaunPenh"/>
+        <a:font script="Knda" typeface="Tunga"/>
+        <a:font script="Guru" typeface="Raavi"/>
+        <a:font script="Cans" typeface="Euphemia"/>
+        <a:font script="Cher" typeface="Plantagenet Cherokee"/>
+        <a:font script="Yiii" typeface="Microsoft Yi Baiti"/>
+        <a:font script="Tibt" typeface="Microsoft Himalaya"/>
+        <a:font script="Thaa" typeface="MV Boli"/>
+        <a:font script="Deva" typeface="Mangal"/>
+        <a:font script="Telu" typeface="Gautami"/>
+        <a:font script="Taml" typeface="Latha"/>
+        <a:font script="Syrc" typeface="Estrangelo Edessa"/>
+        <a:font script="Orya" typeface="Kalinga"/>
+        <a:font script="Mlym" typeface="Kartika"/>
+        <a:font script="Laoo" typeface="DokChampa"/>
+        <a:font script="Sinh" typeface="Iskoola Pota"/>
+        <a:font script="Mong" typeface="Mongolian Baiti"/>
+        <a:font script="Viet" typeface="Arial"/>
+        <a:font script="Uigh" typeface="Microsoft Uighur"/>
+        <a:font script="Geor" typeface="Sylfaen"/>
+      </a:minorFont>
+    </a:fontScheme>
+    <a:fmtScheme name="Office">
+      <a:fillStyleLst>
+        <a:solidFill>
+          <a:schemeClr val="phClr"/>
+        </a:solidFill>
+        <a:gradFill rotWithShape="1">
+          <a:gsLst>
+            <a:gs pos="0">
+              <a:schemeClr val="phClr">
+                <a:tint val="50000"/>
+                <a:satMod val="300000"/>
+              </a:schemeClr>
+            </a:gs>
+            <a:gs pos="35000">
+              <a:schemeClr val="phClr">
+                <a:tint val="37000"/>
+                <a:satMod val="300000"/>
+              </a:schemeClr>
+            </a:gs>
+            <a:gs pos="100000">
+              <a:schemeClr val="phClr">
+                <a:tint val="15000"/>
+                <a:satMod val="350000"/>
+              </a:schemeClr>
+            </a:gs>
+          </a:gsLst>
+          <a:lin ang="16200000" scaled="1"/>
+        </a:gradFill>
+        <a:gradFill rotWithShape="1">
+          <a:gsLst>
+            <a:gs pos="0">
+              <a:schemeClr val="phClr">
+                <a:shade val="51000"/>
+                <a:satMod val="130000"/>
+              </a:schemeClr>
+            </a:gs>
+            <a:gs pos="80000">
+              <a:schemeClr val="phClr">
+                <a:shade val="93000"/>
+                <a:satMod val="130000"/>
+              </a:schemeClr>
+            </a:gs>
+            <a:gs pos="100000">
+              <a:schemeClr val="phClr">
+                <a:shade val="94000"/>
+                <a:satMod val="135000"/>
+              </a:schemeClr>
+            </a:gs>
+          </a:gsLst>
+          <a:lin ang="16200000" scaled="0"/>
+        </a:gradFill>
+      </a:fillStyleLst>
+      <a:lnStyleLst>
+        <a:ln w="9525" cap="flat" cmpd="sng" algn="ctr">
+          <a:solidFill>
+            <a:schemeClr val="phClr">
+              <a:shade val="95000"/>
+              <a:satMod val="105000"/>
+            </a:schemeClr>
+          </a:solidFill>
+          <a:prstDash val="solid"/>
+        </a:ln>
+        <a:ln w="25400" cap="flat" cmpd="sng" algn="ctr">
+          <a:solidFill>
+            <a:schemeClr val="phClr"/>
+          </a:solidFill>
+          <a:prstDash val="solid"/>
+        </a:ln>
+        <a:ln w="38100" cap="flat" cmpd="sng" algn="ctr">
+          <a:solidFill>
+            <a:schemeClr val="phClr"/>
+          </a:solidFill>
+          <a:prstDash val="solid"/>
+        </a:ln>
+      </a:lnStyleLst>
+      <a:effectStyleLst>
+        <a:effectStyle>
+          <a:effectLst>
+            <a:outerShdw blurRad="40000" dist="20000" dir="5400000" rotWithShape="0">
+              <a:srgbClr val="000000">
+                <a:alpha val="38000"/>
+              </a:srgbClr>
+            </a:outerShdw>
+          </a:effectLst>
+        </a:effectStyle>
+        <a:effectStyle>
+          <a:effectLst>
+            <a:outerShdw blurRad="40000" dist="23000" dir="5400000" rotWithShape="0">
+              <a:srgbClr val="000000">
+                <a:alpha val="35000"/>
+              </a:srgbClr>
+            </a:outerShdw>
+          </a:effectLst>
+        </a:effectStyle>
+        <a:effectStyle>
+          <a:effectLst>
+            <a:outerShdw blurRad="40000" dist="23000" dir="5400000" rotWithShape="0">
+              <a:srgbClr val="000000">
+                <a:alpha val="35000"/>
+              </a:srgbClr>
+            </a:outerShdw>
+          </a:effectLst>
+          <a:scene3d>
+            <a:camera prst="orthographicFront">
+              <a:rot lat="0" lon="0" rev="0"/>
+            </a:camera>
+            <a:lightRig rig="threePt" dir="t">
+              <a:rot lat="0" lon="0" rev="1200000"/>
+            </a:lightRig>
+          </a:scene3d>
+          <a:sp3d>
+            <a:bevelT w="63500" h="25400"/>
+          </a:sp3d>
+        </a:effectStyle>
+      </a:effectStyleLst>
+      <a:bgFillStyleLst>
+        <a:solidFill>
+          <a:schemeClr val="phClr"/>
+        </a:solidFill>
+        <a:gradFill rotWithShape="1">
+          <a:gsLst>
+            <a:gs pos="0">
+              <a:schemeClr val="phClr">
+                <a:tint val="40000"/>
+                <a:satMod val="350000"/>
+              </a:schemeClr>
+            </a:gs>
+            <a:gs pos="40000">
+              <a:schemeClr val="phClr">
+                <a:tint val="45000"/>
+                <a:shade val="99000"/>
+                <a:satMod val="350000"/>
+              </a:schemeClr>
+            </a:gs>
+            <a:gs pos="100000">
+              <a:schemeClr val="phClr">
+                <a:shade val="20000"/>
+                <a:satMod val="255000"/>
+              </a:schemeClr>
+            </a:gs>
+          </a:gsLst>
+          <a:path path="circle">
+            <a:fillToRect l="50000" t="-80000" r="50000" b="180000"/>
+          </a:path>
+        </a:gradFill>
+        <a:gradFill rotWithShape="1">
+          <a:gsLst>
+            <a:gs pos="0">
+              <a:schemeClr val="phClr">
+                <a:tint val="80000"/>
+                <a:satMod val="300000"/>
+              </a:schemeClr>
+            </a:gs>
+            <a:gs pos="100000">
+              <a:schemeClr val="phClr">
+                <a:shade val="30000"/>
+                <a:satMod val="200000"/>
+              </a:schemeClr>
+            </a:gs>
+          </a:gsLst>
+          <a:path path="circle">
+            <a:fillToRect l="50000" t="50000" r="50000" b="50000"/>
+          </a:path>
+        </a:gradFill>
+      </a:bgFillStyleLst>
+    </a:fmtScheme>
+  </a:themeElements>
+  <a:objectDefaults/>
+  <a:extraClrSchemeLst/>
+</a:theme>
 </file>
</xml_diff>

<commit_message>
finissions de ce fichier j'y touche plus
</commit_message>
<xml_diff>
--- a/Docs/game flow et regles a suivre.pptx
+++ b/Docs/game flow et regles a suivre.pptx
@@ -5,13 +5,14 @@
     <p:sldMasterId id="2147483648" r:id="rId1"/>
   </p:sldMasterIdLst>
   <p:notesMasterIdLst>
-    <p:notesMasterId r:id="rId6"/>
+    <p:notesMasterId r:id="rId7"/>
   </p:notesMasterIdLst>
   <p:sldIdLst>
     <p:sldId id="256" r:id="rId2"/>
     <p:sldId id="257" r:id="rId3"/>
     <p:sldId id="258" r:id="rId4"/>
     <p:sldId id="259" r:id="rId5"/>
+    <p:sldId id="260" r:id="rId6"/>
   </p:sldIdLst>
   <p:sldSz cx="9144000" cy="6858000" type="screen4x3"/>
   <p:notesSz cx="6858000" cy="9144000"/>
@@ -5574,6 +5575,413 @@
   <p:clrMapOvr>
     <a:masterClrMapping/>
   </p:clrMapOvr>
+</p:sld>
+</file>
+
+<file path=ppt/slides/slide5.xml><?xml version="1.0" encoding="utf-8"?>
+<p:sld xmlns:a="http://schemas.openxmlformats.org/drawingml/2006/main" xmlns:r="http://schemas.openxmlformats.org/officeDocument/2006/relationships" xmlns:p="http://schemas.openxmlformats.org/presentationml/2006/main">
+  <p:cSld>
+    <p:spTree>
+      <p:nvGrpSpPr>
+        <p:cNvPr id="1" name=""/>
+        <p:cNvGrpSpPr/>
+        <p:nvPr/>
+      </p:nvGrpSpPr>
+      <p:grpSpPr>
+        <a:xfrm>
+          <a:off x="0" y="0"/>
+          <a:ext cx="0" cy="0"/>
+          <a:chOff x="0" y="0"/>
+          <a:chExt cx="0" cy="0"/>
+        </a:xfrm>
+      </p:grpSpPr>
+      <p:sp>
+        <p:nvSpPr>
+          <p:cNvPr id="2" name="Titre 1"/>
+          <p:cNvSpPr>
+            <a:spLocks noGrp="1"/>
+          </p:cNvSpPr>
+          <p:nvPr>
+            <p:ph type="title"/>
+          </p:nvPr>
+        </p:nvSpPr>
+        <p:spPr/>
+        <p:txBody>
+          <a:bodyPr/>
+          <a:lstStyle/>
+          <a:p>
+            <a:r>
+              <a:rPr lang="fr-FR" dirty="0" smtClean="0"/>
+              <a:t>Game flow des menu</a:t>
+            </a:r>
+            <a:endParaRPr lang="fr-FR" dirty="0"/>
+          </a:p>
+        </p:txBody>
+      </p:sp>
+      <p:sp>
+        <p:nvSpPr>
+          <p:cNvPr id="5" name="Rectangle 4"/>
+          <p:cNvSpPr/>
+          <p:nvPr/>
+        </p:nvSpPr>
+        <p:spPr>
+          <a:xfrm>
+            <a:off x="2915816" y="1463497"/>
+            <a:ext cx="3528392" cy="914400"/>
+          </a:xfrm>
+          <a:prstGeom prst="rect">
+            <a:avLst/>
+          </a:prstGeom>
+        </p:spPr>
+        <p:style>
+          <a:lnRef idx="2">
+            <a:schemeClr val="accent1">
+              <a:shade val="50000"/>
+            </a:schemeClr>
+          </a:lnRef>
+          <a:fillRef idx="1">
+            <a:schemeClr val="accent1"/>
+          </a:fillRef>
+          <a:effectRef idx="0">
+            <a:schemeClr val="accent1"/>
+          </a:effectRef>
+          <a:fontRef idx="minor">
+            <a:schemeClr val="lt1"/>
+          </a:fontRef>
+        </p:style>
+        <p:txBody>
+          <a:bodyPr rtlCol="0" anchor="ctr"/>
+          <a:lstStyle/>
+          <a:p>
+            <a:pPr algn="ctr"/>
+            <a:r>
+              <a:rPr lang="fr-FR" dirty="0" smtClean="0"/>
+              <a:t>Menu principal</a:t>
+            </a:r>
+            <a:endParaRPr lang="fr-FR" dirty="0"/>
+          </a:p>
+        </p:txBody>
+      </p:sp>
+      <p:cxnSp>
+        <p:nvCxnSpPr>
+          <p:cNvPr id="7" name="Connecteur droit avec flèche 6"/>
+          <p:cNvCxnSpPr>
+            <a:stCxn id="5" idx="2"/>
+            <a:endCxn id="8" idx="0"/>
+          </p:cNvCxnSpPr>
+          <p:nvPr/>
+        </p:nvCxnSpPr>
+        <p:spPr>
+          <a:xfrm flipH="1">
+            <a:off x="4658278" y="2377897"/>
+            <a:ext cx="21734" cy="475039"/>
+          </a:xfrm>
+          <a:prstGeom prst="straightConnector1">
+            <a:avLst/>
+          </a:prstGeom>
+          <a:ln>
+            <a:tailEnd type="arrow"/>
+          </a:ln>
+        </p:spPr>
+        <p:style>
+          <a:lnRef idx="1">
+            <a:schemeClr val="accent1"/>
+          </a:lnRef>
+          <a:fillRef idx="0">
+            <a:schemeClr val="accent1"/>
+          </a:fillRef>
+          <a:effectRef idx="0">
+            <a:schemeClr val="accent1"/>
+          </a:effectRef>
+          <a:fontRef idx="minor">
+            <a:schemeClr val="tx1"/>
+          </a:fontRef>
+        </p:style>
+      </p:cxnSp>
+      <p:sp>
+        <p:nvSpPr>
+          <p:cNvPr id="8" name="Rectangle 7"/>
+          <p:cNvSpPr/>
+          <p:nvPr/>
+        </p:nvSpPr>
+        <p:spPr>
+          <a:xfrm>
+            <a:off x="3254122" y="2852936"/>
+            <a:ext cx="2808312" cy="914400"/>
+          </a:xfrm>
+          <a:prstGeom prst="rect">
+            <a:avLst/>
+          </a:prstGeom>
+        </p:spPr>
+        <p:style>
+          <a:lnRef idx="2">
+            <a:schemeClr val="accent1">
+              <a:shade val="50000"/>
+            </a:schemeClr>
+          </a:lnRef>
+          <a:fillRef idx="1">
+            <a:schemeClr val="accent1"/>
+          </a:fillRef>
+          <a:effectRef idx="0">
+            <a:schemeClr val="accent1"/>
+          </a:effectRef>
+          <a:fontRef idx="minor">
+            <a:schemeClr val="lt1"/>
+          </a:fontRef>
+        </p:style>
+        <p:txBody>
+          <a:bodyPr rtlCol="0" anchor="ctr"/>
+          <a:lstStyle/>
+          <a:p>
+            <a:pPr algn="ctr"/>
+            <a:r>
+              <a:rPr lang="fr-FR" dirty="0" smtClean="0"/>
+              <a:t>Bouton </a:t>
+            </a:r>
+            <a:r>
+              <a:rPr lang="fr-FR" dirty="0" err="1" smtClean="0"/>
+              <a:t>play</a:t>
+            </a:r>
+            <a:endParaRPr lang="fr-FR" dirty="0"/>
+          </a:p>
+        </p:txBody>
+      </p:sp>
+      <p:sp>
+        <p:nvSpPr>
+          <p:cNvPr id="13" name="Rectangle 12"/>
+          <p:cNvSpPr/>
+          <p:nvPr/>
+        </p:nvSpPr>
+        <p:spPr>
+          <a:xfrm>
+            <a:off x="3314725" y="4206210"/>
+            <a:ext cx="2708840" cy="792088"/>
+          </a:xfrm>
+          <a:prstGeom prst="rect">
+            <a:avLst/>
+          </a:prstGeom>
+          <a:solidFill>
+            <a:schemeClr val="tx1"/>
+          </a:solidFill>
+        </p:spPr>
+        <p:style>
+          <a:lnRef idx="2">
+            <a:schemeClr val="accent1">
+              <a:shade val="50000"/>
+            </a:schemeClr>
+          </a:lnRef>
+          <a:fillRef idx="1">
+            <a:schemeClr val="accent1"/>
+          </a:fillRef>
+          <a:effectRef idx="0">
+            <a:schemeClr val="accent1"/>
+          </a:effectRef>
+          <a:fontRef idx="minor">
+            <a:schemeClr val="lt1"/>
+          </a:fontRef>
+        </p:style>
+        <p:txBody>
+          <a:bodyPr rtlCol="0" anchor="ctr"/>
+          <a:lstStyle/>
+          <a:p>
+            <a:pPr algn="ctr"/>
+            <a:r>
+              <a:rPr lang="fr-FR" dirty="0" smtClean="0"/>
+              <a:t>Game lancé</a:t>
+            </a:r>
+            <a:endParaRPr lang="fr-FR" dirty="0"/>
+          </a:p>
+        </p:txBody>
+      </p:sp>
+      <p:cxnSp>
+        <p:nvCxnSpPr>
+          <p:cNvPr id="15" name="Connecteur droit avec flèche 14"/>
+          <p:cNvCxnSpPr>
+            <a:stCxn id="8" idx="2"/>
+            <a:endCxn id="13" idx="0"/>
+          </p:cNvCxnSpPr>
+          <p:nvPr/>
+        </p:nvCxnSpPr>
+        <p:spPr>
+          <a:xfrm>
+            <a:off x="4658278" y="3767336"/>
+            <a:ext cx="10867" cy="438874"/>
+          </a:xfrm>
+          <a:prstGeom prst="straightConnector1">
+            <a:avLst/>
+          </a:prstGeom>
+          <a:ln>
+            <a:tailEnd type="arrow"/>
+          </a:ln>
+        </p:spPr>
+        <p:style>
+          <a:lnRef idx="1">
+            <a:schemeClr val="accent1"/>
+          </a:lnRef>
+          <a:fillRef idx="0">
+            <a:schemeClr val="accent1"/>
+          </a:fillRef>
+          <a:effectRef idx="0">
+            <a:schemeClr val="accent1"/>
+          </a:effectRef>
+          <a:fontRef idx="minor">
+            <a:schemeClr val="tx1"/>
+          </a:fontRef>
+        </p:style>
+      </p:cxnSp>
+      <p:sp>
+        <p:nvSpPr>
+          <p:cNvPr id="20" name="Pentagone régulier 19"/>
+          <p:cNvSpPr/>
+          <p:nvPr/>
+        </p:nvSpPr>
+        <p:spPr>
+          <a:xfrm>
+            <a:off x="3707904" y="5241024"/>
+            <a:ext cx="1512168" cy="1382412"/>
+          </a:xfrm>
+          <a:prstGeom prst="pentagon">
+            <a:avLst/>
+          </a:prstGeom>
+        </p:spPr>
+        <p:style>
+          <a:lnRef idx="2">
+            <a:schemeClr val="accent1">
+              <a:shade val="50000"/>
+            </a:schemeClr>
+          </a:lnRef>
+          <a:fillRef idx="1">
+            <a:schemeClr val="accent1"/>
+          </a:fillRef>
+          <a:effectRef idx="0">
+            <a:schemeClr val="accent1"/>
+          </a:effectRef>
+          <a:fontRef idx="minor">
+            <a:schemeClr val="lt1"/>
+          </a:fontRef>
+        </p:style>
+        <p:txBody>
+          <a:bodyPr rtlCol="0" anchor="ctr"/>
+          <a:lstStyle/>
+          <a:p>
+            <a:pPr algn="ctr"/>
+            <a:r>
+              <a:rPr lang="fr-FR" dirty="0" smtClean="0"/>
+              <a:t>Si </a:t>
+            </a:r>
+            <a:r>
+              <a:rPr lang="fr-FR" dirty="0" err="1" smtClean="0"/>
+              <a:t>vieDeLaFriteuse</a:t>
+            </a:r>
+            <a:r>
+              <a:rPr lang="fr-FR" dirty="0"/>
+              <a:t> </a:t>
+            </a:r>
+            <a:r>
+              <a:rPr lang="fr-FR" dirty="0" smtClean="0"/>
+              <a:t>== 0 </a:t>
+            </a:r>
+            <a:endParaRPr lang="fr-FR" dirty="0"/>
+          </a:p>
+        </p:txBody>
+      </p:sp>
+      <p:cxnSp>
+        <p:nvCxnSpPr>
+          <p:cNvPr id="22" name="Connecteur droit avec flèche 21"/>
+          <p:cNvCxnSpPr>
+            <a:stCxn id="13" idx="2"/>
+            <a:endCxn id="20" idx="0"/>
+          </p:cNvCxnSpPr>
+          <p:nvPr/>
+        </p:nvCxnSpPr>
+        <p:spPr>
+          <a:xfrm flipH="1">
+            <a:off x="4463988" y="4998298"/>
+            <a:ext cx="205157" cy="242726"/>
+          </a:xfrm>
+          <a:prstGeom prst="straightConnector1">
+            <a:avLst/>
+          </a:prstGeom>
+          <a:ln>
+            <a:tailEnd type="arrow"/>
+          </a:ln>
+        </p:spPr>
+        <p:style>
+          <a:lnRef idx="1">
+            <a:schemeClr val="accent1"/>
+          </a:lnRef>
+          <a:fillRef idx="0">
+            <a:schemeClr val="accent1"/>
+          </a:fillRef>
+          <a:effectRef idx="0">
+            <a:schemeClr val="accent1"/>
+          </a:effectRef>
+          <a:fontRef idx="minor">
+            <a:schemeClr val="tx1"/>
+          </a:fontRef>
+        </p:style>
+      </p:cxnSp>
+      <p:sp>
+        <p:nvSpPr>
+          <p:cNvPr id="27" name="Flèche courbée vers la gauche 26"/>
+          <p:cNvSpPr/>
+          <p:nvPr/>
+        </p:nvSpPr>
+        <p:spPr>
+          <a:xfrm rot="10116148">
+            <a:off x="1877586" y="1756267"/>
+            <a:ext cx="1233703" cy="4792524"/>
+          </a:xfrm>
+          <a:prstGeom prst="curvedLeftArrow">
+            <a:avLst/>
+          </a:prstGeom>
+        </p:spPr>
+        <p:style>
+          <a:lnRef idx="2">
+            <a:schemeClr val="accent1">
+              <a:shade val="50000"/>
+            </a:schemeClr>
+          </a:lnRef>
+          <a:fillRef idx="1">
+            <a:schemeClr val="accent1"/>
+          </a:fillRef>
+          <a:effectRef idx="0">
+            <a:schemeClr val="accent1"/>
+          </a:effectRef>
+          <a:fontRef idx="minor">
+            <a:schemeClr val="lt1"/>
+          </a:fontRef>
+        </p:style>
+        <p:txBody>
+          <a:bodyPr rtlCol="0" anchor="ctr"/>
+          <a:lstStyle/>
+          <a:p>
+            <a:pPr algn="ctr"/>
+            <a:endParaRPr lang="fr-FR">
+              <a:solidFill>
+                <a:schemeClr val="tx1"/>
+              </a:solidFill>
+            </a:endParaRPr>
+          </a:p>
+        </p:txBody>
+      </p:sp>
+    </p:spTree>
+    <p:extLst>
+      <p:ext uri="{BB962C8B-B14F-4D97-AF65-F5344CB8AC3E}">
+        <p14:creationId xmlns:p14="http://schemas.microsoft.com/office/powerpoint/2010/main" val="1576377393"/>
+      </p:ext>
+    </p:extLst>
+  </p:cSld>
+  <p:clrMapOvr>
+    <a:masterClrMapping/>
+  </p:clrMapOvr>
+  <p:timing>
+    <p:tnLst>
+      <p:par>
+        <p:cTn id="1" dur="indefinite" restart="never" nodeType="tmRoot"/>
+      </p:par>
+    </p:tnLst>
+  </p:timing>
 </p:sld>
 </file>
 

</xml_diff>